<commit_message>
Rule --> Table로 이름 바꿈
간단한 로직 구현(Dealer, User)
 - init, hit, stand
 - Table 추상화
</commit_message>
<xml_diff>
--- a/PPT/20181112_창종_자바4.pptx
+++ b/PPT/20181112_창종_자바4.pptx
@@ -151,6 +151,172 @@
 
 <file path=ppt/changesInfos/changesInfo1.xml><?xml version="1.0" encoding="utf-8"?>
 <pc:chgInfo xmlns:a="http://schemas.openxmlformats.org/drawingml/2006/main" xmlns:r="http://schemas.openxmlformats.org/officeDocument/2006/relationships" xmlns:ac="http://schemas.microsoft.com/office/drawing/2013/main/command" xmlns:pc="http://schemas.microsoft.com/office/powerpoint/2013/main/command">
+  <pc:docChgLst>
+    <pc:chgData name="현 창종" userId="1754a67024955d5b" providerId="LiveId" clId="{4E44495A-C033-46E0-905E-923C73821750}"/>
+    <pc:docChg chg="undo custSel addSld delSld modSld sldOrd">
+      <pc:chgData name="현 창종" userId="1754a67024955d5b" providerId="LiveId" clId="{4E44495A-C033-46E0-905E-923C73821750}" dt="2018-10-05T07:03:14.841" v="4905" actId="478"/>
+      <pc:docMkLst>
+        <pc:docMk/>
+      </pc:docMkLst>
+      <pc:sldChg chg="modSp">
+        <pc:chgData name="현 창종" userId="1754a67024955d5b" providerId="LiveId" clId="{4E44495A-C033-46E0-905E-923C73821750}" dt="2018-10-04T13:21:19.203" v="3386" actId="20577"/>
+        <pc:sldMkLst>
+          <pc:docMk/>
+          <pc:sldMk cId="1035360619" sldId="282"/>
+        </pc:sldMkLst>
+        <pc:spChg chg="mod">
+          <ac:chgData name="현 창종" userId="1754a67024955d5b" providerId="LiveId" clId="{4E44495A-C033-46E0-905E-923C73821750}" dt="2018-10-04T10:50:44.274" v="17" actId="20577"/>
+          <ac:spMkLst>
+            <pc:docMk/>
+            <pc:sldMk cId="1035360619" sldId="282"/>
+            <ac:spMk id="2" creationId="{00000000-0000-0000-0000-000000000000}"/>
+          </ac:spMkLst>
+        </pc:spChg>
+        <pc:spChg chg="mod">
+          <ac:chgData name="현 창종" userId="1754a67024955d5b" providerId="LiveId" clId="{4E44495A-C033-46E0-905E-923C73821750}" dt="2018-10-04T13:21:19.203" v="3386" actId="20577"/>
+          <ac:spMkLst>
+            <pc:docMk/>
+            <pc:sldMk cId="1035360619" sldId="282"/>
+            <ac:spMk id="3" creationId="{00000000-0000-0000-0000-000000000000}"/>
+          </ac:spMkLst>
+        </pc:spChg>
+      </pc:sldChg>
+      <pc:sldChg chg="delSp modSp">
+        <pc:chgData name="현 창종" userId="1754a67024955d5b" providerId="LiveId" clId="{4E44495A-C033-46E0-905E-923C73821750}" dt="2018-10-04T13:14:04.227" v="3231" actId="20577"/>
+        <pc:sldMkLst>
+          <pc:docMk/>
+          <pc:sldMk cId="2293112979" sldId="421"/>
+        </pc:sldMkLst>
+        <pc:spChg chg="mod">
+          <ac:chgData name="현 창종" userId="1754a67024955d5b" providerId="LiveId" clId="{4E44495A-C033-46E0-905E-923C73821750}" dt="2018-10-04T10:50:40.883" v="16" actId="20577"/>
+          <ac:spMkLst>
+            <pc:docMk/>
+            <pc:sldMk cId="2293112979" sldId="421"/>
+            <ac:spMk id="4" creationId="{C42C111B-6578-4AD5-B946-4DD9662D23B0}"/>
+          </ac:spMkLst>
+        </pc:spChg>
+        <pc:spChg chg="mod">
+          <ac:chgData name="현 창종" userId="1754a67024955d5b" providerId="LiveId" clId="{4E44495A-C033-46E0-905E-923C73821750}" dt="2018-10-04T13:14:04.227" v="3231" actId="20577"/>
+          <ac:spMkLst>
+            <pc:docMk/>
+            <pc:sldMk cId="2293112979" sldId="421"/>
+            <ac:spMk id="31" creationId="{207DE5D7-EA16-40BC-A396-CC7D5AB21A80}"/>
+          </ac:spMkLst>
+        </pc:spChg>
+        <pc:picChg chg="del">
+          <ac:chgData name="현 창종" userId="1754a67024955d5b" providerId="LiveId" clId="{4E44495A-C033-46E0-905E-923C73821750}" dt="2018-10-04T10:50:46.355" v="18" actId="478"/>
+          <ac:picMkLst>
+            <pc:docMk/>
+            <pc:sldMk cId="2293112979" sldId="421"/>
+            <ac:picMk id="5" creationId="{06BE7275-AE46-4A16-88D2-C918E6DA5123}"/>
+          </ac:picMkLst>
+        </pc:picChg>
+      </pc:sldChg>
+      <pc:sldChg chg="addSp delSp modSp">
+        <pc:chgData name="현 창종" userId="1754a67024955d5b" providerId="LiveId" clId="{4E44495A-C033-46E0-905E-923C73821750}" dt="2018-10-04T12:06:45.252" v="837" actId="20577"/>
+        <pc:sldMkLst>
+          <pc:docMk/>
+          <pc:sldMk cId="1530182771" sldId="422"/>
+        </pc:sldMkLst>
+        <pc:spChg chg="mod">
+          <ac:chgData name="현 창종" userId="1754a67024955d5b" providerId="LiveId" clId="{4E44495A-C033-46E0-905E-923C73821750}" dt="2018-10-04T10:58:06.787" v="273" actId="20577"/>
+          <ac:spMkLst>
+            <pc:docMk/>
+            <pc:sldMk cId="1530182771" sldId="422"/>
+            <ac:spMk id="4" creationId="{C42C111B-6578-4AD5-B946-4DD9662D23B0}"/>
+          </ac:spMkLst>
+        </pc:spChg>
+        <pc:spChg chg="add mod">
+          <ac:chgData name="현 창종" userId="1754a67024955d5b" providerId="LiveId" clId="{4E44495A-C033-46E0-905E-923C73821750}" dt="2018-10-04T11:58:57.916" v="430" actId="1076"/>
+          <ac:spMkLst>
+            <pc:docMk/>
+            <pc:sldMk cId="1530182771" sldId="422"/>
+            <ac:spMk id="7" creationId="{5A398FB4-8202-4C96-9BE6-E3A802CA63D2}"/>
+          </ac:spMkLst>
+        </pc:spChg>
+        <pc:spChg chg="add mod">
+          <ac:chgData name="현 창종" userId="1754a67024955d5b" providerId="LiveId" clId="{4E44495A-C033-46E0-905E-923C73821750}" dt="2018-10-04T11:58:57.916" v="430" actId="1076"/>
+          <ac:spMkLst>
+            <pc:docMk/>
+            <pc:sldMk cId="1530182771" sldId="422"/>
+            <ac:spMk id="8" creationId="{3BC1D1E9-ED48-451B-9041-98E3E3152E48}"/>
+          </ac:spMkLst>
+        </pc:spChg>
+        <pc:spChg chg="add mod">
+          <ac:chgData name="현 창종" userId="1754a67024955d5b" providerId="LiveId" clId="{4E44495A-C033-46E0-905E-923C73821750}" dt="2018-10-04T11:59:05.623" v="431" actId="20577"/>
+          <ac:spMkLst>
+            <pc:docMk/>
+            <pc:sldMk cId="1530182771" sldId="422"/>
+            <ac:spMk id="9" creationId="{82E06380-528A-4521-9FA5-7DC34BF0FFCB}"/>
+          </ac:spMkLst>
+        </pc:spChg>
+        <pc:spChg chg="add mod">
+          <ac:chgData name="현 창종" userId="1754a67024955d5b" providerId="LiveId" clId="{4E44495A-C033-46E0-905E-923C73821750}" dt="2018-10-04T11:58:57.916" v="430" actId="1076"/>
+          <ac:spMkLst>
+            <pc:docMk/>
+            <pc:sldMk cId="1530182771" sldId="422"/>
+            <ac:spMk id="11" creationId="{20377CEA-22FF-4A7F-8785-F6462CD72B75}"/>
+          </ac:spMkLst>
+        </pc:spChg>
+        <pc:spChg chg="add mod">
+          <ac:chgData name="현 창종" userId="1754a67024955d5b" providerId="LiveId" clId="{4E44495A-C033-46E0-905E-923C73821750}" dt="2018-10-04T11:58:57.916" v="430" actId="1076"/>
+          <ac:spMkLst>
+            <pc:docMk/>
+            <pc:sldMk cId="1530182771" sldId="422"/>
+            <ac:spMk id="12" creationId="{19D13CF2-14CF-40ED-AAB3-91F6C3F19F04}"/>
+          </ac:spMkLst>
+        </pc:spChg>
+        <pc:spChg chg="add mod">
+          <ac:chgData name="현 창종" userId="1754a67024955d5b" providerId="LiveId" clId="{4E44495A-C033-46E0-905E-923C73821750}" dt="2018-10-04T11:59:21.158" v="435" actId="20577"/>
+          <ac:spMkLst>
+            <pc:docMk/>
+            <pc:sldMk cId="1530182771" sldId="422"/>
+            <ac:spMk id="13" creationId="{49245817-5782-4919-B3ED-A0F00BA21CB6}"/>
+          </ac:spMkLst>
+        </pc:spChg>
+        <pc:spChg chg="mod">
+          <ac:chgData name="현 창종" userId="1754a67024955d5b" providerId="LiveId" clId="{4E44495A-C033-46E0-905E-923C73821750}" dt="2018-10-04T12:06:45.252" v="837" actId="20577"/>
+          <ac:spMkLst>
+            <pc:docMk/>
+            <pc:sldMk cId="1530182771" sldId="422"/>
+            <ac:spMk id="31" creationId="{207DE5D7-EA16-40BC-A396-CC7D5AB21A80}"/>
+          </ac:spMkLst>
+        </pc:spChg>
+        <pc:picChg chg="del">
+          <ac:chgData name="현 창종" userId="1754a67024955d5b" providerId="LiveId" clId="{4E44495A-C033-46E0-905E-923C73821750}" dt="2018-10-04T10:58:11.811" v="274" actId="478"/>
+          <ac:picMkLst>
+            <pc:docMk/>
+            <pc:sldMk cId="1530182771" sldId="422"/>
+            <ac:picMk id="5" creationId="{A55B6D8C-E326-4F7D-821A-E8003AF4D416}"/>
+          </ac:picMkLst>
+        </pc:picChg>
+        <pc:picChg chg="add mod">
+          <ac:chgData name="현 창종" userId="1754a67024955d5b" providerId="LiveId" clId="{4E44495A-C033-46E0-905E-923C73821750}" dt="2018-10-04T11:57:48.087" v="392" actId="1076"/>
+          <ac:picMkLst>
+            <pc:docMk/>
+            <pc:sldMk cId="1530182771" sldId="422"/>
+            <ac:picMk id="6" creationId="{9A396354-4908-4ADF-BCFB-F744C89E7D3B}"/>
+          </ac:picMkLst>
+        </pc:picChg>
+        <pc:cxnChg chg="add mod">
+          <ac:chgData name="현 창종" userId="1754a67024955d5b" providerId="LiveId" clId="{4E44495A-C033-46E0-905E-923C73821750}" dt="2018-10-04T11:59:15.533" v="432" actId="11529"/>
+          <ac:cxnSpMkLst>
+            <pc:docMk/>
+            <pc:sldMk cId="1530182771" sldId="422"/>
+            <ac:cxnSpMk id="14" creationId="{A468803C-3F59-4D2C-8213-06AD6A27E586}"/>
+          </ac:cxnSpMkLst>
+        </pc:cxnChg>
+        <pc:cxnChg chg="add mod">
+          <ac:chgData name="현 창종" userId="1754a67024955d5b" providerId="LiveId" clId="{4E44495A-C033-46E0-905E-923C73821750}" dt="2018-10-04T11:59:19.419" v="434" actId="1076"/>
+          <ac:cxnSpMkLst>
+            <pc:docMk/>
+            <pc:sldMk cId="1530182771" sldId="422"/>
+            <ac:cxnSpMk id="16" creationId="{58F9A131-FDC4-4589-9F92-31F22BFEA817}"/>
+          </ac:cxnSpMkLst>
+        </pc:cxnChg>
+      </pc:sldChg>
+    </pc:docChg>
+  </pc:docChgLst>
   <pc:docChgLst>
     <pc:chgData name="현 창종" userId="1754a67024955d5b" providerId="LiveId" clId="{A9770F4F-4E3A-42ED-96D3-6195517043B2}"/>
     <pc:docChg chg="undo custSel addSld delSld modSld">
@@ -686,172 +852,6 @@
       </pc:sldChg>
     </pc:docChg>
   </pc:docChgLst>
-  <pc:docChgLst>
-    <pc:chgData name="현 창종" userId="1754a67024955d5b" providerId="LiveId" clId="{4E44495A-C033-46E0-905E-923C73821750}"/>
-    <pc:docChg chg="undo custSel addSld delSld modSld sldOrd">
-      <pc:chgData name="현 창종" userId="1754a67024955d5b" providerId="LiveId" clId="{4E44495A-C033-46E0-905E-923C73821750}" dt="2018-10-05T07:03:14.841" v="4905" actId="478"/>
-      <pc:docMkLst>
-        <pc:docMk/>
-      </pc:docMkLst>
-      <pc:sldChg chg="modSp">
-        <pc:chgData name="현 창종" userId="1754a67024955d5b" providerId="LiveId" clId="{4E44495A-C033-46E0-905E-923C73821750}" dt="2018-10-04T13:21:19.203" v="3386" actId="20577"/>
-        <pc:sldMkLst>
-          <pc:docMk/>
-          <pc:sldMk cId="1035360619" sldId="282"/>
-        </pc:sldMkLst>
-        <pc:spChg chg="mod">
-          <ac:chgData name="현 창종" userId="1754a67024955d5b" providerId="LiveId" clId="{4E44495A-C033-46E0-905E-923C73821750}" dt="2018-10-04T10:50:44.274" v="17" actId="20577"/>
-          <ac:spMkLst>
-            <pc:docMk/>
-            <pc:sldMk cId="1035360619" sldId="282"/>
-            <ac:spMk id="2" creationId="{00000000-0000-0000-0000-000000000000}"/>
-          </ac:spMkLst>
-        </pc:spChg>
-        <pc:spChg chg="mod">
-          <ac:chgData name="현 창종" userId="1754a67024955d5b" providerId="LiveId" clId="{4E44495A-C033-46E0-905E-923C73821750}" dt="2018-10-04T13:21:19.203" v="3386" actId="20577"/>
-          <ac:spMkLst>
-            <pc:docMk/>
-            <pc:sldMk cId="1035360619" sldId="282"/>
-            <ac:spMk id="3" creationId="{00000000-0000-0000-0000-000000000000}"/>
-          </ac:spMkLst>
-        </pc:spChg>
-      </pc:sldChg>
-      <pc:sldChg chg="delSp modSp">
-        <pc:chgData name="현 창종" userId="1754a67024955d5b" providerId="LiveId" clId="{4E44495A-C033-46E0-905E-923C73821750}" dt="2018-10-04T13:14:04.227" v="3231" actId="20577"/>
-        <pc:sldMkLst>
-          <pc:docMk/>
-          <pc:sldMk cId="2293112979" sldId="421"/>
-        </pc:sldMkLst>
-        <pc:spChg chg="mod">
-          <ac:chgData name="현 창종" userId="1754a67024955d5b" providerId="LiveId" clId="{4E44495A-C033-46E0-905E-923C73821750}" dt="2018-10-04T10:50:40.883" v="16" actId="20577"/>
-          <ac:spMkLst>
-            <pc:docMk/>
-            <pc:sldMk cId="2293112979" sldId="421"/>
-            <ac:spMk id="4" creationId="{C42C111B-6578-4AD5-B946-4DD9662D23B0}"/>
-          </ac:spMkLst>
-        </pc:spChg>
-        <pc:spChg chg="mod">
-          <ac:chgData name="현 창종" userId="1754a67024955d5b" providerId="LiveId" clId="{4E44495A-C033-46E0-905E-923C73821750}" dt="2018-10-04T13:14:04.227" v="3231" actId="20577"/>
-          <ac:spMkLst>
-            <pc:docMk/>
-            <pc:sldMk cId="2293112979" sldId="421"/>
-            <ac:spMk id="31" creationId="{207DE5D7-EA16-40BC-A396-CC7D5AB21A80}"/>
-          </ac:spMkLst>
-        </pc:spChg>
-        <pc:picChg chg="del">
-          <ac:chgData name="현 창종" userId="1754a67024955d5b" providerId="LiveId" clId="{4E44495A-C033-46E0-905E-923C73821750}" dt="2018-10-04T10:50:46.355" v="18" actId="478"/>
-          <ac:picMkLst>
-            <pc:docMk/>
-            <pc:sldMk cId="2293112979" sldId="421"/>
-            <ac:picMk id="5" creationId="{06BE7275-AE46-4A16-88D2-C918E6DA5123}"/>
-          </ac:picMkLst>
-        </pc:picChg>
-      </pc:sldChg>
-      <pc:sldChg chg="addSp delSp modSp">
-        <pc:chgData name="현 창종" userId="1754a67024955d5b" providerId="LiveId" clId="{4E44495A-C033-46E0-905E-923C73821750}" dt="2018-10-04T12:06:45.252" v="837" actId="20577"/>
-        <pc:sldMkLst>
-          <pc:docMk/>
-          <pc:sldMk cId="1530182771" sldId="422"/>
-        </pc:sldMkLst>
-        <pc:spChg chg="mod">
-          <ac:chgData name="현 창종" userId="1754a67024955d5b" providerId="LiveId" clId="{4E44495A-C033-46E0-905E-923C73821750}" dt="2018-10-04T10:58:06.787" v="273" actId="20577"/>
-          <ac:spMkLst>
-            <pc:docMk/>
-            <pc:sldMk cId="1530182771" sldId="422"/>
-            <ac:spMk id="4" creationId="{C42C111B-6578-4AD5-B946-4DD9662D23B0}"/>
-          </ac:spMkLst>
-        </pc:spChg>
-        <pc:spChg chg="add mod">
-          <ac:chgData name="현 창종" userId="1754a67024955d5b" providerId="LiveId" clId="{4E44495A-C033-46E0-905E-923C73821750}" dt="2018-10-04T11:58:57.916" v="430" actId="1076"/>
-          <ac:spMkLst>
-            <pc:docMk/>
-            <pc:sldMk cId="1530182771" sldId="422"/>
-            <ac:spMk id="7" creationId="{5A398FB4-8202-4C96-9BE6-E3A802CA63D2}"/>
-          </ac:spMkLst>
-        </pc:spChg>
-        <pc:spChg chg="add mod">
-          <ac:chgData name="현 창종" userId="1754a67024955d5b" providerId="LiveId" clId="{4E44495A-C033-46E0-905E-923C73821750}" dt="2018-10-04T11:58:57.916" v="430" actId="1076"/>
-          <ac:spMkLst>
-            <pc:docMk/>
-            <pc:sldMk cId="1530182771" sldId="422"/>
-            <ac:spMk id="8" creationId="{3BC1D1E9-ED48-451B-9041-98E3E3152E48}"/>
-          </ac:spMkLst>
-        </pc:spChg>
-        <pc:spChg chg="add mod">
-          <ac:chgData name="현 창종" userId="1754a67024955d5b" providerId="LiveId" clId="{4E44495A-C033-46E0-905E-923C73821750}" dt="2018-10-04T11:59:05.623" v="431" actId="20577"/>
-          <ac:spMkLst>
-            <pc:docMk/>
-            <pc:sldMk cId="1530182771" sldId="422"/>
-            <ac:spMk id="9" creationId="{82E06380-528A-4521-9FA5-7DC34BF0FFCB}"/>
-          </ac:spMkLst>
-        </pc:spChg>
-        <pc:spChg chg="add mod">
-          <ac:chgData name="현 창종" userId="1754a67024955d5b" providerId="LiveId" clId="{4E44495A-C033-46E0-905E-923C73821750}" dt="2018-10-04T11:58:57.916" v="430" actId="1076"/>
-          <ac:spMkLst>
-            <pc:docMk/>
-            <pc:sldMk cId="1530182771" sldId="422"/>
-            <ac:spMk id="11" creationId="{20377CEA-22FF-4A7F-8785-F6462CD72B75}"/>
-          </ac:spMkLst>
-        </pc:spChg>
-        <pc:spChg chg="add mod">
-          <ac:chgData name="현 창종" userId="1754a67024955d5b" providerId="LiveId" clId="{4E44495A-C033-46E0-905E-923C73821750}" dt="2018-10-04T11:58:57.916" v="430" actId="1076"/>
-          <ac:spMkLst>
-            <pc:docMk/>
-            <pc:sldMk cId="1530182771" sldId="422"/>
-            <ac:spMk id="12" creationId="{19D13CF2-14CF-40ED-AAB3-91F6C3F19F04}"/>
-          </ac:spMkLst>
-        </pc:spChg>
-        <pc:spChg chg="add mod">
-          <ac:chgData name="현 창종" userId="1754a67024955d5b" providerId="LiveId" clId="{4E44495A-C033-46E0-905E-923C73821750}" dt="2018-10-04T11:59:21.158" v="435" actId="20577"/>
-          <ac:spMkLst>
-            <pc:docMk/>
-            <pc:sldMk cId="1530182771" sldId="422"/>
-            <ac:spMk id="13" creationId="{49245817-5782-4919-B3ED-A0F00BA21CB6}"/>
-          </ac:spMkLst>
-        </pc:spChg>
-        <pc:spChg chg="mod">
-          <ac:chgData name="현 창종" userId="1754a67024955d5b" providerId="LiveId" clId="{4E44495A-C033-46E0-905E-923C73821750}" dt="2018-10-04T12:06:45.252" v="837" actId="20577"/>
-          <ac:spMkLst>
-            <pc:docMk/>
-            <pc:sldMk cId="1530182771" sldId="422"/>
-            <ac:spMk id="31" creationId="{207DE5D7-EA16-40BC-A396-CC7D5AB21A80}"/>
-          </ac:spMkLst>
-        </pc:spChg>
-        <pc:picChg chg="del">
-          <ac:chgData name="현 창종" userId="1754a67024955d5b" providerId="LiveId" clId="{4E44495A-C033-46E0-905E-923C73821750}" dt="2018-10-04T10:58:11.811" v="274" actId="478"/>
-          <ac:picMkLst>
-            <pc:docMk/>
-            <pc:sldMk cId="1530182771" sldId="422"/>
-            <ac:picMk id="5" creationId="{A55B6D8C-E326-4F7D-821A-E8003AF4D416}"/>
-          </ac:picMkLst>
-        </pc:picChg>
-        <pc:picChg chg="add mod">
-          <ac:chgData name="현 창종" userId="1754a67024955d5b" providerId="LiveId" clId="{4E44495A-C033-46E0-905E-923C73821750}" dt="2018-10-04T11:57:48.087" v="392" actId="1076"/>
-          <ac:picMkLst>
-            <pc:docMk/>
-            <pc:sldMk cId="1530182771" sldId="422"/>
-            <ac:picMk id="6" creationId="{9A396354-4908-4ADF-BCFB-F744C89E7D3B}"/>
-          </ac:picMkLst>
-        </pc:picChg>
-        <pc:cxnChg chg="add mod">
-          <ac:chgData name="현 창종" userId="1754a67024955d5b" providerId="LiveId" clId="{4E44495A-C033-46E0-905E-923C73821750}" dt="2018-10-04T11:59:15.533" v="432" actId="11529"/>
-          <ac:cxnSpMkLst>
-            <pc:docMk/>
-            <pc:sldMk cId="1530182771" sldId="422"/>
-            <ac:cxnSpMk id="14" creationId="{A468803C-3F59-4D2C-8213-06AD6A27E586}"/>
-          </ac:cxnSpMkLst>
-        </pc:cxnChg>
-        <pc:cxnChg chg="add mod">
-          <ac:chgData name="현 창종" userId="1754a67024955d5b" providerId="LiveId" clId="{4E44495A-C033-46E0-905E-923C73821750}" dt="2018-10-04T11:59:19.419" v="434" actId="1076"/>
-          <ac:cxnSpMkLst>
-            <pc:docMk/>
-            <pc:sldMk cId="1530182771" sldId="422"/>
-            <ac:cxnSpMk id="16" creationId="{58F9A131-FDC4-4589-9F92-31F22BFEA817}"/>
-          </ac:cxnSpMkLst>
-        </pc:cxnChg>
-      </pc:sldChg>
-    </pc:docChg>
-  </pc:docChgLst>
 </pc:chgInfo>
 </file>
 
@@ -937,7 +937,7 @@
           <a:p>
             <a:fld id="{3BE1057E-872F-4572-A234-913AF419E0E8}" type="datetimeFigureOut">
               <a:rPr lang="ko-KR" altLang="en-US" smtClean="0"/>
-              <a:t>2018-11-11</a:t>
+              <a:t>2018-11-19</a:t>
             </a:fld>
             <a:endParaRPr lang="ko-KR" altLang="en-US"/>
           </a:p>
@@ -1102,7 +1102,7 @@
           <a:p>
             <a:fld id="{2DC2D4C3-DB00-466D-AA64-CD5F7D93DD3E}" type="datetimeFigureOut">
               <a:rPr lang="ko-KR" altLang="en-US" smtClean="0"/>
-              <a:t>2018-11-11</a:t>
+              <a:t>2018-11-19</a:t>
             </a:fld>
             <a:endParaRPr lang="ko-KR" altLang="en-US"/>
           </a:p>
@@ -4783,8 +4783,8 @@
               <a:t> </a:t>
             </a:r>
             <a:r>
-              <a:rPr lang="en-US" altLang="ko-KR" sz="3600" dirty="0"/>
-              <a:t>3</a:t>
+              <a:rPr lang="en-US" altLang="ko-KR" sz="3600"/>
+              <a:t>4</a:t>
             </a:r>
             <a:endParaRPr lang="ko-KR" altLang="en-US" sz="3600" dirty="0"/>
           </a:p>

</xml_diff>